<commit_message>
Přidán slide na Logování a slide s checklistem požadavků projektu
</commit_message>
<xml_diff>
--- a/Prezentace.PPTX
+++ b/Prezentace.PPTX
@@ -13,7 +13,9 @@
     <p:sldId id="261" r:id="rId7"/>
     <p:sldId id="262" r:id="rId8"/>
     <p:sldId id="263" r:id="rId9"/>
-    <p:sldId id="264" r:id="rId10"/>
+    <p:sldId id="265" r:id="rId10"/>
+    <p:sldId id="266" r:id="rId11"/>
+    <p:sldId id="264" r:id="rId12"/>
   </p:sldIdLst>
   <p:sldSz cx="12192000" cy="6858000"/>
   <p:notesSz cx="6858000" cy="9144000"/>
@@ -26170,6 +26172,74 @@
     <p:extLst>
       <p:ext uri="{BB962C8B-B14F-4D97-AF65-F5344CB8AC3E}">
         <p14:creationId xmlns:p14="http://schemas.microsoft.com/office/powerpoint/2010/main" val="1795402813"/>
+      </p:ext>
+    </p:extLst>
+  </p:cSld>
+  <p:clrMapOvr>
+    <a:masterClrMapping/>
+  </p:clrMapOvr>
+</p:sld>
+</file>
+
+<file path=ppt/slides/slide10.xml><?xml version="1.0" encoding="utf-8"?>
+<p:sld xmlns:a="http://schemas.openxmlformats.org/drawingml/2006/main" xmlns:r="http://schemas.openxmlformats.org/officeDocument/2006/relationships" xmlns:p="http://schemas.openxmlformats.org/presentationml/2006/main">
+  <p:cSld>
+    <p:spTree>
+      <p:nvGrpSpPr>
+        <p:cNvPr id="1" name=""/>
+        <p:cNvGrpSpPr/>
+        <p:nvPr/>
+      </p:nvGrpSpPr>
+      <p:grpSpPr>
+        <a:xfrm>
+          <a:off x="0" y="0"/>
+          <a:ext cx="0" cy="0"/>
+          <a:chOff x="0" y="0"/>
+          <a:chExt cx="0" cy="0"/>
+        </a:xfrm>
+      </p:grpSpPr>
+      <p:sp>
+        <p:nvSpPr>
+          <p:cNvPr id="2" name="TextovéPole 1">
+            <a:extLst>
+              <a:ext uri="{FF2B5EF4-FFF2-40B4-BE49-F238E27FC236}">
+                <a16:creationId xmlns:a16="http://schemas.microsoft.com/office/drawing/2014/main" id="{2D26A207-F0E3-4FC6-817C-8F1A989AF886}"/>
+              </a:ext>
+            </a:extLst>
+          </p:cNvPr>
+          <p:cNvSpPr txBox="1"/>
+          <p:nvPr/>
+        </p:nvSpPr>
+        <p:spPr>
+          <a:xfrm>
+            <a:off x="2633662" y="2967335"/>
+            <a:ext cx="6924675" cy="923330"/>
+          </a:xfrm>
+          <a:prstGeom prst="rect">
+            <a:avLst/>
+          </a:prstGeom>
+          <a:noFill/>
+        </p:spPr>
+        <p:txBody>
+          <a:bodyPr wrap="square" rtlCol="0">
+            <a:spAutoFit/>
+          </a:bodyPr>
+          <a:lstStyle/>
+          <a:p>
+            <a:pPr algn="ctr"/>
+            <a:r>
+              <a:rPr lang="cs-CZ" sz="5400" dirty="0">
+                <a:latin typeface="Vidaloka"/>
+              </a:rPr>
+              <a:t>Děkujeme za pozornost</a:t>
+            </a:r>
+          </a:p>
+        </p:txBody>
+      </p:sp>
+    </p:spTree>
+    <p:extLst>
+      <p:ext uri="{BB962C8B-B14F-4D97-AF65-F5344CB8AC3E}">
+        <p14:creationId xmlns:p14="http://schemas.microsoft.com/office/powerpoint/2010/main" val="3571794150"/>
       </p:ext>
     </p:extLst>
   </p:cSld>
@@ -27304,46 +27374,346 @@
       </p:grpSpPr>
       <p:sp>
         <p:nvSpPr>
-          <p:cNvPr id="2" name="TextovéPole 1">
+          <p:cNvPr id="2" name="Nadpis 1">
             <a:extLst>
               <a:ext uri="{FF2B5EF4-FFF2-40B4-BE49-F238E27FC236}">
-                <a16:creationId xmlns:a16="http://schemas.microsoft.com/office/drawing/2014/main" id="{2D26A207-F0E3-4FC6-817C-8F1A989AF886}"/>
+                <a16:creationId xmlns:a16="http://schemas.microsoft.com/office/drawing/2014/main" id="{46F07F20-DAA1-4D44-A87C-5E03F105A6E6}"/>
               </a:ext>
             </a:extLst>
           </p:cNvPr>
-          <p:cNvSpPr txBox="1"/>
+          <p:cNvSpPr>
+            <a:spLocks noGrp="1"/>
+          </p:cNvSpPr>
+          <p:nvPr>
+            <p:ph type="title"/>
+          </p:nvPr>
+        </p:nvSpPr>
+        <p:spPr/>
+        <p:txBody>
+          <a:bodyPr/>
+          <a:lstStyle/>
+          <a:p>
+            <a:r>
+              <a:rPr lang="cs-CZ" dirty="0"/>
+              <a:t>Logování</a:t>
+            </a:r>
+          </a:p>
+        </p:txBody>
+      </p:sp>
+      <p:pic>
+        <p:nvPicPr>
+          <p:cNvPr id="5" name="Obrázek 4">
+            <a:extLst>
+              <a:ext uri="{FF2B5EF4-FFF2-40B4-BE49-F238E27FC236}">
+                <a16:creationId xmlns:a16="http://schemas.microsoft.com/office/drawing/2014/main" id="{9481E7FD-AE46-48A5-9BC1-587229E31801}"/>
+              </a:ext>
+            </a:extLst>
+          </p:cNvPr>
+          <p:cNvPicPr>
+            <a:picLocks noChangeAspect="1"/>
+          </p:cNvPicPr>
           <p:nvPr/>
-        </p:nvSpPr>
+        </p:nvPicPr>
+        <p:blipFill>
+          <a:blip r:embed="rId2">
+            <a:extLst>
+              <a:ext uri="{28A0092B-C50C-407E-A947-70E740481C1C}">
+                <a14:useLocalDpi xmlns:a14="http://schemas.microsoft.com/office/drawing/2010/main" val="0"/>
+              </a:ext>
+            </a:extLst>
+          </a:blip>
+          <a:stretch>
+            <a:fillRect/>
+          </a:stretch>
+        </p:blipFill>
         <p:spPr>
           <a:xfrm>
-            <a:off x="2633662" y="2967335"/>
-            <a:ext cx="6924675" cy="923330"/>
+            <a:off x="2647468" y="1647576"/>
+            <a:ext cx="6897063" cy="3562847"/>
           </a:xfrm>
           <a:prstGeom prst="rect">
             <a:avLst/>
           </a:prstGeom>
-          <a:noFill/>
         </p:spPr>
+      </p:pic>
+    </p:spTree>
+    <p:extLst>
+      <p:ext uri="{BB962C8B-B14F-4D97-AF65-F5344CB8AC3E}">
+        <p14:creationId xmlns:p14="http://schemas.microsoft.com/office/powerpoint/2010/main" val="1421048299"/>
+      </p:ext>
+    </p:extLst>
+  </p:cSld>
+  <p:clrMapOvr>
+    <a:masterClrMapping/>
+  </p:clrMapOvr>
+</p:sld>
+</file>
+
+<file path=ppt/slides/slide9.xml><?xml version="1.0" encoding="utf-8"?>
+<p:sld xmlns:a="http://schemas.openxmlformats.org/drawingml/2006/main" xmlns:r="http://schemas.openxmlformats.org/officeDocument/2006/relationships" xmlns:p="http://schemas.openxmlformats.org/presentationml/2006/main">
+  <p:cSld>
+    <p:spTree>
+      <p:nvGrpSpPr>
+        <p:cNvPr id="1" name=""/>
+        <p:cNvGrpSpPr/>
+        <p:nvPr/>
+      </p:nvGrpSpPr>
+      <p:grpSpPr>
+        <a:xfrm>
+          <a:off x="0" y="0"/>
+          <a:ext cx="0" cy="0"/>
+          <a:chOff x="0" y="0"/>
+          <a:chExt cx="0" cy="0"/>
+        </a:xfrm>
+      </p:grpSpPr>
+      <p:sp>
+        <p:nvSpPr>
+          <p:cNvPr id="2" name="Nadpis 1">
+            <a:extLst>
+              <a:ext uri="{FF2B5EF4-FFF2-40B4-BE49-F238E27FC236}">
+                <a16:creationId xmlns:a16="http://schemas.microsoft.com/office/drawing/2014/main" id="{41EA096C-F4DC-4C5B-A90B-6DDB5CD86981}"/>
+              </a:ext>
+            </a:extLst>
+          </p:cNvPr>
+          <p:cNvSpPr>
+            <a:spLocks noGrp="1"/>
+          </p:cNvSpPr>
+          <p:nvPr>
+            <p:ph type="title"/>
+          </p:nvPr>
+        </p:nvSpPr>
+        <p:spPr/>
         <p:txBody>
-          <a:bodyPr wrap="square" rtlCol="0">
-            <a:spAutoFit/>
-          </a:bodyPr>
+          <a:bodyPr/>
           <a:lstStyle/>
           <a:p>
-            <a:pPr algn="ctr"/>
             <a:r>
-              <a:rPr lang="cs-CZ" sz="5400" dirty="0">
-                <a:latin typeface="Vidaloka"/>
-              </a:rPr>
-              <a:t>Děkujeme za pozornost</a:t>
+              <a:rPr lang="cs-CZ" dirty="0"/>
+              <a:t>Checklist požadavků </a:t>
             </a:r>
           </a:p>
         </p:txBody>
       </p:sp>
+      <p:sp>
+        <p:nvSpPr>
+          <p:cNvPr id="3" name="Zástupný text 2">
+            <a:extLst>
+              <a:ext uri="{FF2B5EF4-FFF2-40B4-BE49-F238E27FC236}">
+                <a16:creationId xmlns:a16="http://schemas.microsoft.com/office/drawing/2014/main" id="{CB389D18-C6F2-45E4-A95F-41D74D9628E0}"/>
+              </a:ext>
+            </a:extLst>
+          </p:cNvPr>
+          <p:cNvSpPr>
+            <a:spLocks noGrp="1"/>
+          </p:cNvSpPr>
+          <p:nvPr>
+            <p:ph type="body" idx="1"/>
+          </p:nvPr>
+        </p:nvSpPr>
+        <p:spPr>
+          <a:xfrm>
+            <a:off x="951000" y="1697233"/>
+            <a:ext cx="6044604" cy="4394400"/>
+          </a:xfrm>
+        </p:spPr>
+        <p:txBody>
+          <a:bodyPr/>
+          <a:lstStyle/>
+          <a:p>
+            <a:r>
+              <a:rPr lang="cs-CZ" dirty="0"/>
+              <a:t>„Aplikace bude provádět šifrování souborů s hesly na základě uživatelem zvoleného algoritmu a délky klíče“</a:t>
+            </a:r>
+          </a:p>
+          <a:p>
+            <a:endParaRPr lang="cs-CZ" dirty="0"/>
+          </a:p>
+          <a:p>
+            <a:r>
+              <a:rPr lang="cs-CZ" dirty="0"/>
+              <a:t>„Bude také zajištěna kontrola integrity souboru s hesly“</a:t>
+            </a:r>
+          </a:p>
+          <a:p>
+            <a:endParaRPr lang="cs-CZ" dirty="0"/>
+          </a:p>
+          <a:p>
+            <a:r>
+              <a:rPr lang="cs-CZ" dirty="0"/>
+              <a:t>„Pro šifrování souboru s hesly a jeho kontrolu integrity implementujte minimálně tři různé algoritmy “</a:t>
+            </a:r>
+          </a:p>
+          <a:p>
+            <a:endParaRPr lang="cs-CZ" dirty="0"/>
+          </a:p>
+          <a:p>
+            <a:r>
+              <a:rPr lang="cs-CZ" dirty="0"/>
+              <a:t>„Aplikace bude zaznamenávat proběhlé události (přístup do aplikace, k jednotlivým heslům, …) do logu včetně času“</a:t>
+            </a:r>
+          </a:p>
+        </p:txBody>
+      </p:sp>
+      <p:pic>
+        <p:nvPicPr>
+          <p:cNvPr id="5" name="Grafický objekt 4" descr="Zaškrtnutí">
+            <a:extLst>
+              <a:ext uri="{FF2B5EF4-FFF2-40B4-BE49-F238E27FC236}">
+                <a16:creationId xmlns:a16="http://schemas.microsoft.com/office/drawing/2014/main" id="{47038F65-7FDD-4ED4-9A70-02A78FBA49B6}"/>
+              </a:ext>
+            </a:extLst>
+          </p:cNvPr>
+          <p:cNvPicPr>
+            <a:picLocks noChangeAspect="1"/>
+          </p:cNvPicPr>
+          <p:nvPr/>
+        </p:nvPicPr>
+        <p:blipFill>
+          <a:blip r:embed="rId2">
+            <a:extLst>
+              <a:ext uri="{28A0092B-C50C-407E-A947-70E740481C1C}">
+                <a14:useLocalDpi xmlns:a14="http://schemas.microsoft.com/office/drawing/2010/main" val="0"/>
+              </a:ext>
+              <a:ext uri="{96DAC541-7B7A-43D3-8B79-37D633B846F1}">
+                <asvg:svgBlip xmlns:asvg="http://schemas.microsoft.com/office/drawing/2016/SVG/main" r:embed="rId3"/>
+              </a:ext>
+            </a:extLst>
+          </a:blip>
+          <a:stretch>
+            <a:fillRect/>
+          </a:stretch>
+        </p:blipFill>
+        <p:spPr>
+          <a:xfrm>
+            <a:off x="6868982" y="1773313"/>
+            <a:ext cx="363985" cy="363985"/>
+          </a:xfrm>
+          <a:prstGeom prst="rect">
+            <a:avLst/>
+          </a:prstGeom>
+        </p:spPr>
+      </p:pic>
+      <p:pic>
+        <p:nvPicPr>
+          <p:cNvPr id="6" name="Grafický objekt 5" descr="Zaškrtnutí">
+            <a:extLst>
+              <a:ext uri="{FF2B5EF4-FFF2-40B4-BE49-F238E27FC236}">
+                <a16:creationId xmlns:a16="http://schemas.microsoft.com/office/drawing/2014/main" id="{9F6D465B-E573-4453-BCA5-115D3F9070A2}"/>
+              </a:ext>
+            </a:extLst>
+          </p:cNvPr>
+          <p:cNvPicPr>
+            <a:picLocks noChangeAspect="1"/>
+          </p:cNvPicPr>
+          <p:nvPr/>
+        </p:nvPicPr>
+        <p:blipFill>
+          <a:blip r:embed="rId2">
+            <a:extLst>
+              <a:ext uri="{28A0092B-C50C-407E-A947-70E740481C1C}">
+                <a14:useLocalDpi xmlns:a14="http://schemas.microsoft.com/office/drawing/2010/main" val="0"/>
+              </a:ext>
+              <a:ext uri="{96DAC541-7B7A-43D3-8B79-37D633B846F1}">
+                <asvg:svgBlip xmlns:asvg="http://schemas.microsoft.com/office/drawing/2016/SVG/main" r:embed="rId3"/>
+              </a:ext>
+            </a:extLst>
+          </a:blip>
+          <a:stretch>
+            <a:fillRect/>
+          </a:stretch>
+        </p:blipFill>
+        <p:spPr>
+          <a:xfrm>
+            <a:off x="6868981" y="2376995"/>
+            <a:ext cx="363985" cy="363985"/>
+          </a:xfrm>
+          <a:prstGeom prst="rect">
+            <a:avLst/>
+          </a:prstGeom>
+        </p:spPr>
+      </p:pic>
+      <p:pic>
+        <p:nvPicPr>
+          <p:cNvPr id="7" name="Grafický objekt 6" descr="Zaškrtnutí">
+            <a:extLst>
+              <a:ext uri="{FF2B5EF4-FFF2-40B4-BE49-F238E27FC236}">
+                <a16:creationId xmlns:a16="http://schemas.microsoft.com/office/drawing/2014/main" id="{878AC1E8-A256-4DCF-B902-216BC81AD4E1}"/>
+              </a:ext>
+            </a:extLst>
+          </p:cNvPr>
+          <p:cNvPicPr>
+            <a:picLocks noChangeAspect="1"/>
+          </p:cNvPicPr>
+          <p:nvPr/>
+        </p:nvPicPr>
+        <p:blipFill>
+          <a:blip r:embed="rId2">
+            <a:extLst>
+              <a:ext uri="{28A0092B-C50C-407E-A947-70E740481C1C}">
+                <a14:useLocalDpi xmlns:a14="http://schemas.microsoft.com/office/drawing/2010/main" val="0"/>
+              </a:ext>
+              <a:ext uri="{96DAC541-7B7A-43D3-8B79-37D633B846F1}">
+                <asvg:svgBlip xmlns:asvg="http://schemas.microsoft.com/office/drawing/2016/SVG/main" r:embed="rId3"/>
+              </a:ext>
+            </a:extLst>
+          </a:blip>
+          <a:stretch>
+            <a:fillRect/>
+          </a:stretch>
+        </p:blipFill>
+        <p:spPr>
+          <a:xfrm>
+            <a:off x="6853327" y="2980677"/>
+            <a:ext cx="363985" cy="363985"/>
+          </a:xfrm>
+          <a:prstGeom prst="rect">
+            <a:avLst/>
+          </a:prstGeom>
+        </p:spPr>
+      </p:pic>
+      <p:pic>
+        <p:nvPicPr>
+          <p:cNvPr id="8" name="Grafický objekt 7" descr="Zaškrtnutí">
+            <a:extLst>
+              <a:ext uri="{FF2B5EF4-FFF2-40B4-BE49-F238E27FC236}">
+                <a16:creationId xmlns:a16="http://schemas.microsoft.com/office/drawing/2014/main" id="{3B8E8306-E197-406A-952B-2C894B372859}"/>
+              </a:ext>
+            </a:extLst>
+          </p:cNvPr>
+          <p:cNvPicPr>
+            <a:picLocks noChangeAspect="1"/>
+          </p:cNvPicPr>
+          <p:nvPr/>
+        </p:nvPicPr>
+        <p:blipFill>
+          <a:blip r:embed="rId2">
+            <a:extLst>
+              <a:ext uri="{28A0092B-C50C-407E-A947-70E740481C1C}">
+                <a14:useLocalDpi xmlns:a14="http://schemas.microsoft.com/office/drawing/2010/main" val="0"/>
+              </a:ext>
+              <a:ext uri="{96DAC541-7B7A-43D3-8B79-37D633B846F1}">
+                <asvg:svgBlip xmlns:asvg="http://schemas.microsoft.com/office/drawing/2016/SVG/main" r:embed="rId3"/>
+              </a:ext>
+            </a:extLst>
+          </a:blip>
+          <a:stretch>
+            <a:fillRect/>
+          </a:stretch>
+        </p:blipFill>
+        <p:spPr>
+          <a:xfrm>
+            <a:off x="6853327" y="3584359"/>
+            <a:ext cx="363985" cy="363985"/>
+          </a:xfrm>
+          <a:prstGeom prst="rect">
+            <a:avLst/>
+          </a:prstGeom>
+        </p:spPr>
+      </p:pic>
     </p:spTree>
     <p:extLst>
       <p:ext uri="{BB962C8B-B14F-4D97-AF65-F5344CB8AC3E}">
-        <p14:creationId xmlns:p14="http://schemas.microsoft.com/office/powerpoint/2010/main" val="3571794150"/>
+        <p14:creationId xmlns:p14="http://schemas.microsoft.com/office/powerpoint/2010/main" val="2624931568"/>
       </p:ext>
     </p:extLst>
   </p:cSld>

</xml_diff>

<commit_message>
Odobrany slide s bezpecnym ukoncenim, zmena poradia
</commit_message>
<xml_diff>
--- a/Prezentace.PPTX
+++ b/Prezentace.PPTX
@@ -8,14 +8,13 @@
   <p:sldIdLst>
     <p:sldId id="256" r:id="rId3"/>
     <p:sldId id="257" r:id="rId4"/>
-    <p:sldId id="259" r:id="rId5"/>
-    <p:sldId id="260" r:id="rId6"/>
-    <p:sldId id="261" r:id="rId7"/>
-    <p:sldId id="262" r:id="rId8"/>
-    <p:sldId id="263" r:id="rId9"/>
-    <p:sldId id="265" r:id="rId10"/>
-    <p:sldId id="266" r:id="rId11"/>
-    <p:sldId id="264" r:id="rId12"/>
+    <p:sldId id="260" r:id="rId5"/>
+    <p:sldId id="261" r:id="rId6"/>
+    <p:sldId id="262" r:id="rId7"/>
+    <p:sldId id="265" r:id="rId8"/>
+    <p:sldId id="259" r:id="rId9"/>
+    <p:sldId id="266" r:id="rId10"/>
+    <p:sldId id="264" r:id="rId11"/>
   </p:sldIdLst>
   <p:sldSz cx="12192000" cy="6858000"/>
   <p:notesSz cx="6858000" cy="9144000"/>
@@ -26181,74 +26180,6 @@
 </p:sld>
 </file>
 
-<file path=ppt/slides/slide10.xml><?xml version="1.0" encoding="utf-8"?>
-<p:sld xmlns:a="http://schemas.openxmlformats.org/drawingml/2006/main" xmlns:r="http://schemas.openxmlformats.org/officeDocument/2006/relationships" xmlns:p="http://schemas.openxmlformats.org/presentationml/2006/main">
-  <p:cSld>
-    <p:spTree>
-      <p:nvGrpSpPr>
-        <p:cNvPr id="1" name=""/>
-        <p:cNvGrpSpPr/>
-        <p:nvPr/>
-      </p:nvGrpSpPr>
-      <p:grpSpPr>
-        <a:xfrm>
-          <a:off x="0" y="0"/>
-          <a:ext cx="0" cy="0"/>
-          <a:chOff x="0" y="0"/>
-          <a:chExt cx="0" cy="0"/>
-        </a:xfrm>
-      </p:grpSpPr>
-      <p:sp>
-        <p:nvSpPr>
-          <p:cNvPr id="2" name="TextovéPole 1">
-            <a:extLst>
-              <a:ext uri="{FF2B5EF4-FFF2-40B4-BE49-F238E27FC236}">
-                <a16:creationId xmlns:a16="http://schemas.microsoft.com/office/drawing/2014/main" id="{2D26A207-F0E3-4FC6-817C-8F1A989AF886}"/>
-              </a:ext>
-            </a:extLst>
-          </p:cNvPr>
-          <p:cNvSpPr txBox="1"/>
-          <p:nvPr/>
-        </p:nvSpPr>
-        <p:spPr>
-          <a:xfrm>
-            <a:off x="2633662" y="2967335"/>
-            <a:ext cx="6924675" cy="923330"/>
-          </a:xfrm>
-          <a:prstGeom prst="rect">
-            <a:avLst/>
-          </a:prstGeom>
-          <a:noFill/>
-        </p:spPr>
-        <p:txBody>
-          <a:bodyPr wrap="square" rtlCol="0">
-            <a:spAutoFit/>
-          </a:bodyPr>
-          <a:lstStyle/>
-          <a:p>
-            <a:pPr algn="ctr"/>
-            <a:r>
-              <a:rPr lang="cs-CZ" sz="5400" dirty="0">
-                <a:latin typeface="Vidaloka"/>
-              </a:rPr>
-              <a:t>Děkujeme za pozornost</a:t>
-            </a:r>
-          </a:p>
-        </p:txBody>
-      </p:sp>
-    </p:spTree>
-    <p:extLst>
-      <p:ext uri="{BB962C8B-B14F-4D97-AF65-F5344CB8AC3E}">
-        <p14:creationId xmlns:p14="http://schemas.microsoft.com/office/powerpoint/2010/main" val="3571794150"/>
-      </p:ext>
-    </p:extLst>
-  </p:cSld>
-  <p:clrMapOvr>
-    <a:masterClrMapping/>
-  </p:clrMapOvr>
-</p:sld>
-</file>
-
 <file path=ppt/slides/slide2.xml><?xml version="1.0" encoding="utf-8"?>
 <p:sld xmlns:a="http://schemas.openxmlformats.org/drawingml/2006/main" xmlns:r="http://schemas.openxmlformats.org/officeDocument/2006/relationships" xmlns:p="http://schemas.openxmlformats.org/presentationml/2006/main">
   <p:cSld>
@@ -26440,66 +26371,6 @@
 </file>
 
 <file path=ppt/slides/slide3.xml><?xml version="1.0" encoding="utf-8"?>
-<p:sld xmlns:a="http://schemas.openxmlformats.org/drawingml/2006/main" xmlns:r="http://schemas.openxmlformats.org/officeDocument/2006/relationships" xmlns:p="http://schemas.openxmlformats.org/presentationml/2006/main">
-  <p:cSld>
-    <p:spTree>
-      <p:nvGrpSpPr>
-        <p:cNvPr id="1" name=""/>
-        <p:cNvGrpSpPr/>
-        <p:nvPr/>
-      </p:nvGrpSpPr>
-      <p:grpSpPr>
-        <a:xfrm>
-          <a:off x="0" y="0"/>
-          <a:ext cx="0" cy="0"/>
-          <a:chOff x="0" y="0"/>
-          <a:chExt cx="0" cy="0"/>
-        </a:xfrm>
-      </p:grpSpPr>
-      <p:pic>
-        <p:nvPicPr>
-          <p:cNvPr id="4" name="Obrázek 3">
-            <a:extLst>
-              <a:ext uri="{FF2B5EF4-FFF2-40B4-BE49-F238E27FC236}">
-                <a16:creationId xmlns:a16="http://schemas.microsoft.com/office/drawing/2014/main" id="{CB3B644F-28E4-4603-9566-359CBD4C4517}"/>
-              </a:ext>
-            </a:extLst>
-          </p:cNvPr>
-          <p:cNvPicPr>
-            <a:picLocks noChangeAspect="1"/>
-          </p:cNvPicPr>
-          <p:nvPr/>
-        </p:nvPicPr>
-        <p:blipFill>
-          <a:blip r:embed="rId2"/>
-          <a:stretch>
-            <a:fillRect/>
-          </a:stretch>
-        </p:blipFill>
-        <p:spPr>
-          <a:xfrm>
-            <a:off x="1399121" y="388758"/>
-            <a:ext cx="9393758" cy="6092724"/>
-          </a:xfrm>
-          <a:prstGeom prst="rect">
-            <a:avLst/>
-          </a:prstGeom>
-        </p:spPr>
-      </p:pic>
-    </p:spTree>
-    <p:extLst>
-      <p:ext uri="{BB962C8B-B14F-4D97-AF65-F5344CB8AC3E}">
-        <p14:creationId xmlns:p14="http://schemas.microsoft.com/office/powerpoint/2010/main" val="1097580506"/>
-      </p:ext>
-    </p:extLst>
-  </p:cSld>
-  <p:clrMapOvr>
-    <a:masterClrMapping/>
-  </p:clrMapOvr>
-</p:sld>
-</file>
-
-<file path=ppt/slides/slide4.xml><?xml version="1.0" encoding="utf-8"?>
 <p:sld xmlns:a="http://schemas.openxmlformats.org/drawingml/2006/main" xmlns:r="http://schemas.openxmlformats.org/officeDocument/2006/relationships" xmlns:p="http://schemas.openxmlformats.org/presentationml/2006/main">
   <p:cSld>
     <p:spTree>
@@ -26735,7 +26606,7 @@
 </p:sld>
 </file>
 
-<file path=ppt/slides/slide5.xml><?xml version="1.0" encoding="utf-8"?>
+<file path=ppt/slides/slide4.xml><?xml version="1.0" encoding="utf-8"?>
 <p:sld xmlns:a="http://schemas.openxmlformats.org/drawingml/2006/main" xmlns:r="http://schemas.openxmlformats.org/officeDocument/2006/relationships" xmlns:p="http://schemas.openxmlformats.org/presentationml/2006/main">
   <p:cSld>
     <p:spTree>
@@ -27052,7 +26923,7 @@
 </p:sld>
 </file>
 
-<file path=ppt/slides/slide6.xml><?xml version="1.0" encoding="utf-8"?>
+<file path=ppt/slides/slide5.xml><?xml version="1.0" encoding="utf-8"?>
 <p:sld xmlns:a="http://schemas.openxmlformats.org/drawingml/2006/main" xmlns:r="http://schemas.openxmlformats.org/officeDocument/2006/relationships" xmlns:p="http://schemas.openxmlformats.org/presentationml/2006/main">
   <p:cSld>
     <p:spTree>
@@ -27231,131 +27102,7 @@
 </p:sld>
 </file>
 
-<file path=ppt/slides/slide7.xml><?xml version="1.0" encoding="utf-8"?>
-<p:sld xmlns:a="http://schemas.openxmlformats.org/drawingml/2006/main" xmlns:r="http://schemas.openxmlformats.org/officeDocument/2006/relationships" xmlns:p="http://schemas.openxmlformats.org/presentationml/2006/main">
-  <p:cSld>
-    <p:spTree>
-      <p:nvGrpSpPr>
-        <p:cNvPr id="1" name=""/>
-        <p:cNvGrpSpPr/>
-        <p:nvPr/>
-      </p:nvGrpSpPr>
-      <p:grpSpPr>
-        <a:xfrm>
-          <a:off x="0" y="0"/>
-          <a:ext cx="0" cy="0"/>
-          <a:chOff x="0" y="0"/>
-          <a:chExt cx="0" cy="0"/>
-        </a:xfrm>
-      </p:grpSpPr>
-      <p:sp>
-        <p:nvSpPr>
-          <p:cNvPr id="2" name="Nadpis 1">
-            <a:extLst>
-              <a:ext uri="{FF2B5EF4-FFF2-40B4-BE49-F238E27FC236}">
-                <a16:creationId xmlns:a16="http://schemas.microsoft.com/office/drawing/2014/main" id="{AA7F81E5-FAB3-424A-82E6-9CF8E26F089D}"/>
-              </a:ext>
-            </a:extLst>
-          </p:cNvPr>
-          <p:cNvSpPr>
-            <a:spLocks noGrp="1"/>
-          </p:cNvSpPr>
-          <p:nvPr>
-            <p:ph type="title"/>
-          </p:nvPr>
-        </p:nvSpPr>
-        <p:spPr/>
-        <p:txBody>
-          <a:bodyPr/>
-          <a:lstStyle/>
-          <a:p>
-            <a:r>
-              <a:rPr lang="cs-CZ" dirty="0"/>
-              <a:t>Bezpečné uložení</a:t>
-            </a:r>
-          </a:p>
-        </p:txBody>
-      </p:sp>
-      <p:sp>
-        <p:nvSpPr>
-          <p:cNvPr id="3" name="Zástupný text 2">
-            <a:extLst>
-              <a:ext uri="{FF2B5EF4-FFF2-40B4-BE49-F238E27FC236}">
-                <a16:creationId xmlns:a16="http://schemas.microsoft.com/office/drawing/2014/main" id="{EFC1DF62-D909-4D68-B913-81954A0A56EE}"/>
-              </a:ext>
-            </a:extLst>
-          </p:cNvPr>
-          <p:cNvSpPr>
-            <a:spLocks noGrp="1"/>
-          </p:cNvSpPr>
-          <p:nvPr>
-            <p:ph type="body" idx="1"/>
-          </p:nvPr>
-        </p:nvSpPr>
-        <p:spPr/>
-        <p:txBody>
-          <a:bodyPr/>
-          <a:lstStyle/>
-          <a:p>
-            <a:pPr>
-              <a:lnSpc>
-                <a:spcPct val="150000"/>
-              </a:lnSpc>
-            </a:pPr>
-            <a:r>
-              <a:rPr lang="cs-CZ" dirty="0"/>
-              <a:t>Z důvodu šifrování a dešifrování</a:t>
-            </a:r>
-          </a:p>
-          <a:p>
-            <a:pPr>
-              <a:lnSpc>
-                <a:spcPct val="150000"/>
-              </a:lnSpc>
-            </a:pPr>
-            <a:r>
-              <a:rPr lang="cs-CZ" dirty="0"/>
-              <a:t>Zavření křížkem</a:t>
-            </a:r>
-          </a:p>
-          <a:p>
-            <a:pPr lvl="1">
-              <a:lnSpc>
-                <a:spcPct val="150000"/>
-              </a:lnSpc>
-            </a:pPr>
-            <a:r>
-              <a:rPr lang="cs-CZ" sz="1400" dirty="0"/>
-              <a:t>Soubor se nezašifruje</a:t>
-            </a:r>
-          </a:p>
-          <a:p>
-            <a:pPr lvl="1">
-              <a:lnSpc>
-                <a:spcPct val="150000"/>
-              </a:lnSpc>
-            </a:pPr>
-            <a:r>
-              <a:rPr lang="cs-CZ" sz="1400" dirty="0"/>
-              <a:t>Nové otevření =&gt; dešifrace nezašifrovaného =&gt; nečitelnost dat</a:t>
-            </a:r>
-          </a:p>
-        </p:txBody>
-      </p:sp>
-    </p:spTree>
-    <p:extLst>
-      <p:ext uri="{BB962C8B-B14F-4D97-AF65-F5344CB8AC3E}">
-        <p14:creationId xmlns:p14="http://schemas.microsoft.com/office/powerpoint/2010/main" val="731760213"/>
-      </p:ext>
-    </p:extLst>
-  </p:cSld>
-  <p:clrMapOvr>
-    <a:masterClrMapping/>
-  </p:clrMapOvr>
-</p:sld>
-</file>
-
-<file path=ppt/slides/slide8.xml><?xml version="1.0" encoding="utf-8"?>
+<file path=ppt/slides/slide6.xml><?xml version="1.0" encoding="utf-8"?>
 <p:sld xmlns:a="http://schemas.openxmlformats.org/drawingml/2006/main" xmlns:r="http://schemas.openxmlformats.org/officeDocument/2006/relationships" xmlns:p="http://schemas.openxmlformats.org/presentationml/2006/main">
   <p:cSld>
     <p:spTree>
@@ -27449,7 +27196,67 @@
 </p:sld>
 </file>
 
-<file path=ppt/slides/slide9.xml><?xml version="1.0" encoding="utf-8"?>
+<file path=ppt/slides/slide7.xml><?xml version="1.0" encoding="utf-8"?>
+<p:sld xmlns:a="http://schemas.openxmlformats.org/drawingml/2006/main" xmlns:r="http://schemas.openxmlformats.org/officeDocument/2006/relationships" xmlns:p="http://schemas.openxmlformats.org/presentationml/2006/main">
+  <p:cSld>
+    <p:spTree>
+      <p:nvGrpSpPr>
+        <p:cNvPr id="1" name=""/>
+        <p:cNvGrpSpPr/>
+        <p:nvPr/>
+      </p:nvGrpSpPr>
+      <p:grpSpPr>
+        <a:xfrm>
+          <a:off x="0" y="0"/>
+          <a:ext cx="0" cy="0"/>
+          <a:chOff x="0" y="0"/>
+          <a:chExt cx="0" cy="0"/>
+        </a:xfrm>
+      </p:grpSpPr>
+      <p:pic>
+        <p:nvPicPr>
+          <p:cNvPr id="4" name="Obrázek 3">
+            <a:extLst>
+              <a:ext uri="{FF2B5EF4-FFF2-40B4-BE49-F238E27FC236}">
+                <a16:creationId xmlns:a16="http://schemas.microsoft.com/office/drawing/2014/main" id="{CB3B644F-28E4-4603-9566-359CBD4C4517}"/>
+              </a:ext>
+            </a:extLst>
+          </p:cNvPr>
+          <p:cNvPicPr>
+            <a:picLocks noChangeAspect="1"/>
+          </p:cNvPicPr>
+          <p:nvPr/>
+        </p:nvPicPr>
+        <p:blipFill>
+          <a:blip r:embed="rId2"/>
+          <a:stretch>
+            <a:fillRect/>
+          </a:stretch>
+        </p:blipFill>
+        <p:spPr>
+          <a:xfrm>
+            <a:off x="1399121" y="388758"/>
+            <a:ext cx="9393758" cy="6092724"/>
+          </a:xfrm>
+          <a:prstGeom prst="rect">
+            <a:avLst/>
+          </a:prstGeom>
+        </p:spPr>
+      </p:pic>
+    </p:spTree>
+    <p:extLst>
+      <p:ext uri="{BB962C8B-B14F-4D97-AF65-F5344CB8AC3E}">
+        <p14:creationId xmlns:p14="http://schemas.microsoft.com/office/powerpoint/2010/main" val="1097580506"/>
+      </p:ext>
+    </p:extLst>
+  </p:cSld>
+  <p:clrMapOvr>
+    <a:masterClrMapping/>
+  </p:clrMapOvr>
+</p:sld>
+</file>
+
+<file path=ppt/slides/slide8.xml><?xml version="1.0" encoding="utf-8"?>
 <p:sld xmlns:a="http://schemas.openxmlformats.org/drawingml/2006/main" xmlns:r="http://schemas.openxmlformats.org/officeDocument/2006/relationships" xmlns:p="http://schemas.openxmlformats.org/presentationml/2006/main">
   <p:cSld>
     <p:spTree>
@@ -27714,6 +27521,74 @@
     <p:extLst>
       <p:ext uri="{BB962C8B-B14F-4D97-AF65-F5344CB8AC3E}">
         <p14:creationId xmlns:p14="http://schemas.microsoft.com/office/powerpoint/2010/main" val="2624931568"/>
+      </p:ext>
+    </p:extLst>
+  </p:cSld>
+  <p:clrMapOvr>
+    <a:masterClrMapping/>
+  </p:clrMapOvr>
+</p:sld>
+</file>
+
+<file path=ppt/slides/slide9.xml><?xml version="1.0" encoding="utf-8"?>
+<p:sld xmlns:a="http://schemas.openxmlformats.org/drawingml/2006/main" xmlns:r="http://schemas.openxmlformats.org/officeDocument/2006/relationships" xmlns:p="http://schemas.openxmlformats.org/presentationml/2006/main">
+  <p:cSld>
+    <p:spTree>
+      <p:nvGrpSpPr>
+        <p:cNvPr id="1" name=""/>
+        <p:cNvGrpSpPr/>
+        <p:nvPr/>
+      </p:nvGrpSpPr>
+      <p:grpSpPr>
+        <a:xfrm>
+          <a:off x="0" y="0"/>
+          <a:ext cx="0" cy="0"/>
+          <a:chOff x="0" y="0"/>
+          <a:chExt cx="0" cy="0"/>
+        </a:xfrm>
+      </p:grpSpPr>
+      <p:sp>
+        <p:nvSpPr>
+          <p:cNvPr id="2" name="TextovéPole 1">
+            <a:extLst>
+              <a:ext uri="{FF2B5EF4-FFF2-40B4-BE49-F238E27FC236}">
+                <a16:creationId xmlns:a16="http://schemas.microsoft.com/office/drawing/2014/main" id="{2D26A207-F0E3-4FC6-817C-8F1A989AF886}"/>
+              </a:ext>
+            </a:extLst>
+          </p:cNvPr>
+          <p:cNvSpPr txBox="1"/>
+          <p:nvPr/>
+        </p:nvSpPr>
+        <p:spPr>
+          <a:xfrm>
+            <a:off x="2633662" y="2967335"/>
+            <a:ext cx="6924675" cy="923330"/>
+          </a:xfrm>
+          <a:prstGeom prst="rect">
+            <a:avLst/>
+          </a:prstGeom>
+          <a:noFill/>
+        </p:spPr>
+        <p:txBody>
+          <a:bodyPr wrap="square" rtlCol="0">
+            <a:spAutoFit/>
+          </a:bodyPr>
+          <a:lstStyle/>
+          <a:p>
+            <a:pPr algn="ctr"/>
+            <a:r>
+              <a:rPr lang="cs-CZ" sz="5400" dirty="0">
+                <a:latin typeface="Vidaloka"/>
+              </a:rPr>
+              <a:t>Děkujeme za pozornost</a:t>
+            </a:r>
+          </a:p>
+        </p:txBody>
+      </p:sp>
+    </p:spTree>
+    <p:extLst>
+      <p:ext uri="{BB962C8B-B14F-4D97-AF65-F5344CB8AC3E}">
+        <p14:creationId xmlns:p14="http://schemas.microsoft.com/office/powerpoint/2010/main" val="3571794150"/>
       </p:ext>
     </p:extLst>
   </p:cSld>

</xml_diff>